<commit_message>
git structure added in ppt
</commit_message>
<xml_diff>
--- a/intel_ocr/docs/Intel_Final_Delivery.pptx
+++ b/intel_ocr/docs/Intel_Final_Delivery.pptx
@@ -5,7 +5,7 @@
     <p:sldMasterId id="2147483708" r:id="rId3"/>
   </p:sldMasterIdLst>
   <p:notesMasterIdLst>
-    <p:notesMasterId r:id="rId20"/>
+    <p:notesMasterId r:id="rId21"/>
   </p:notesMasterIdLst>
   <p:sldIdLst>
     <p:sldId id="257" r:id="rId4"/>
@@ -22,13 +22,14 @@
     <p:sldId id="269" r:id="rId15"/>
     <p:sldId id="270" r:id="rId16"/>
     <p:sldId id="271" r:id="rId17"/>
-    <p:sldId id="272" r:id="rId18"/>
-    <p:sldId id="273" r:id="rId19"/>
+    <p:sldId id="274" r:id="rId18"/>
+    <p:sldId id="272" r:id="rId19"/>
+    <p:sldId id="273" r:id="rId20"/>
   </p:sldIdLst>
   <p:sldSz cx="10969625" cy="6170613"/>
   <p:notesSz cx="6858000" cy="9144000"/>
   <p:custDataLst>
-    <p:tags r:id="rId21"/>
+    <p:tags r:id="rId22"/>
   </p:custDataLst>
   <p:defaultTextStyle>
     <a:defPPr>
@@ -245,7 +246,7 @@
           <a:p>
             <a:fld id="{6007911F-CEAF-4F0B-98BD-EFB38C6572AA}" type="datetimeFigureOut">
               <a:rPr lang="de-DE" smtClean="0"/>
-              <a:t>09.12.2019</a:t>
+              <a:t>11.12.2019</a:t>
             </a:fld>
             <a:endParaRPr lang="de-DE"/>
           </a:p>
@@ -20581,29 +20582,7 @@
                   <a:srgbClr val="0E78C5"/>
                 </a:solidFill>
               </a:rPr>
-              <a:t>Transformation through </a:t>
-            </a:r>
-            <a:r>
-              <a:rPr lang="en-US" b="1" kern="0" dirty="0">
-                <a:ln w="6350">
-                  <a:noFill/>
-                </a:ln>
-                <a:solidFill>
-                  <a:srgbClr val="0E78C5"/>
-                </a:solidFill>
-              </a:rPr>
-              <a:t>Sensors</a:t>
-            </a:r>
-            <a:r>
-              <a:rPr lang="en-US" b="1" kern="0" dirty="0">
-                <a:ln w="6350">
-                  <a:noFill/>
-                </a:ln>
-                <a:solidFill>
-                  <a:srgbClr val="0E78C5"/>
-                </a:solidFill>
-              </a:rPr>
-              <a:t>, Software and Services</a:t>
+              <a:t>Transformation through Sensors, Software and Services</a:t>
             </a:r>
           </a:p>
           <a:p>
@@ -25126,7 +25105,36 @@
           <a:p>
             <a:r>
               <a:rPr lang="en-US" dirty="0" smtClean="0"/>
-              <a:t>Comparison</a:t>
+              <a:t>GITHUB - </a:t>
+            </a:r>
+            <a:r>
+              <a:rPr lang="en-US" dirty="0">
+                <a:hlinkClick r:id="rId2"/>
+              </a:rPr>
+              <a:t>https://github.com/bijonguha/Bosch</a:t>
+            </a:r>
+            <a:endParaRPr lang="en-US" dirty="0"/>
+          </a:p>
+        </p:txBody>
+      </p:sp>
+      <p:sp>
+        <p:nvSpPr>
+          <p:cNvPr id="3" name="Title 2"/>
+          <p:cNvSpPr>
+            <a:spLocks noGrp="1"/>
+          </p:cNvSpPr>
+          <p:nvPr>
+            <p:ph type="title"/>
+          </p:nvPr>
+        </p:nvSpPr>
+        <p:spPr/>
+        <p:txBody>
+          <a:bodyPr/>
+          <a:lstStyle/>
+          <a:p>
+            <a:r>
+              <a:rPr lang="en-US" dirty="0" smtClean="0"/>
+              <a:t>File Structure</a:t>
             </a:r>
             <a:endParaRPr lang="en-US" dirty="0"/>
           </a:p>
@@ -25151,6 +25159,313 @@
               <a:rPr lang="de-DE" smtClean="0"/>
               <a:pPr/>
               <a:t>15</a:t>
+            </a:fld>
+            <a:endParaRPr lang="de-DE"/>
+          </a:p>
+        </p:txBody>
+      </p:sp>
+      <p:sp>
+        <p:nvSpPr>
+          <p:cNvPr id="7" name="TextBox 6"/>
+          <p:cNvSpPr txBox="1"/>
+          <p:nvPr/>
+        </p:nvSpPr>
+        <p:spPr>
+          <a:xfrm>
+            <a:off x="3986657" y="1118597"/>
+            <a:ext cx="2887329" cy="4370427"/>
+          </a:xfrm>
+          <a:prstGeom prst="rect">
+            <a:avLst/>
+          </a:prstGeom>
+          <a:noFill/>
+        </p:spPr>
+        <p:txBody>
+          <a:bodyPr wrap="none" rtlCol="0">
+            <a:spAutoFit/>
+          </a:bodyPr>
+          <a:lstStyle/>
+          <a:p>
+            <a:pPr marL="285750" indent="-285750">
+              <a:buFont typeface="Wingdings" panose="05000000000000000000" pitchFamily="2" charset="2"/>
+              <a:buChar char="§"/>
+            </a:pPr>
+            <a:r>
+              <a:rPr lang="en-US" sz="2000" b="1" dirty="0"/>
+              <a:t>c</a:t>
+            </a:r>
+            <a:r>
+              <a:rPr lang="en-US" sz="2000" b="1" dirty="0" smtClean="0"/>
+              <a:t>odes</a:t>
+            </a:r>
+            <a:r>
+              <a:rPr lang="en-US" dirty="0" smtClean="0"/>
+              <a:t/>
+            </a:r>
+            <a:br>
+              <a:rPr lang="en-US" dirty="0" smtClean="0"/>
+            </a:br>
+            <a:r>
+              <a:rPr lang="en-US" sz="1400" dirty="0" smtClean="0"/>
+              <a:t>&gt;  API SERVER</a:t>
+            </a:r>
+            <a:r>
+              <a:rPr lang="en-US" sz="1400" dirty="0"/>
+              <a:t/>
+            </a:r>
+            <a:br>
+              <a:rPr lang="en-US" sz="1400" dirty="0"/>
+            </a:br>
+            <a:r>
+              <a:rPr lang="en-US" sz="1400" dirty="0" smtClean="0"/>
+              <a:t>&gt; UI</a:t>
+            </a:r>
+            <a:br>
+              <a:rPr lang="en-US" sz="1400" dirty="0" smtClean="0"/>
+            </a:br>
+            <a:r>
+              <a:rPr lang="en-US" sz="1400" dirty="0" smtClean="0"/>
+              <a:t>&gt; data</a:t>
+            </a:r>
+            <a:br>
+              <a:rPr lang="en-US" sz="1400" dirty="0" smtClean="0"/>
+            </a:br>
+            <a:r>
+              <a:rPr lang="en-US" sz="1400" dirty="0" smtClean="0"/>
+              <a:t>&gt; logs</a:t>
+            </a:r>
+            <a:br>
+              <a:rPr lang="en-US" sz="1400" dirty="0" smtClean="0"/>
+            </a:br>
+            <a:r>
+              <a:rPr lang="en-US" sz="1400" dirty="0" smtClean="0"/>
+              <a:t>&gt; models</a:t>
+            </a:r>
+            <a:br>
+              <a:rPr lang="en-US" sz="1400" dirty="0" smtClean="0"/>
+            </a:br>
+            <a:r>
+              <a:rPr lang="en-US" sz="1400" dirty="0" smtClean="0"/>
+              <a:t>&gt; notebooks</a:t>
+            </a:r>
+            <a:br>
+              <a:rPr lang="en-US" sz="1400" dirty="0" smtClean="0"/>
+            </a:br>
+            <a:r>
+              <a:rPr lang="en-US" sz="1400" dirty="0" smtClean="0"/>
+              <a:t>&gt; output</a:t>
+            </a:r>
+            <a:br>
+              <a:rPr lang="en-US" sz="1400" dirty="0" smtClean="0"/>
+            </a:br>
+            <a:r>
+              <a:rPr lang="en-US" sz="1400" dirty="0" smtClean="0"/>
+              <a:t>&gt;</a:t>
+            </a:r>
+            <a:r>
+              <a:rPr lang="en-US" sz="1400" smtClean="0"/>
+              <a:t>standalone_version</a:t>
+            </a:r>
+            <a:r>
+              <a:rPr lang="en-US" sz="1400" dirty="0"/>
+              <a:t/>
+            </a:r>
+            <a:br>
+              <a:rPr lang="en-US" sz="1400" dirty="0"/>
+            </a:br>
+            <a:r>
+              <a:rPr lang="en-US" sz="1400" i="1" dirty="0" smtClean="0">
+                <a:solidFill>
+                  <a:schemeClr val="bg2">
+                    <a:lumMod val="50000"/>
+                  </a:schemeClr>
+                </a:solidFill>
+              </a:rPr>
+              <a:t>requirement_pip.txt</a:t>
+            </a:r>
+            <a:r>
+              <a:rPr lang="en-US" sz="1400" dirty="0" smtClean="0"/>
+              <a:t/>
+            </a:r>
+            <a:br>
+              <a:rPr lang="en-US" sz="1400" dirty="0" smtClean="0"/>
+            </a:br>
+            <a:r>
+              <a:rPr lang="en-US" sz="1400" b="1" dirty="0" smtClean="0">
+                <a:solidFill>
+                  <a:schemeClr val="accent1">
+                    <a:lumMod val="50000"/>
+                  </a:schemeClr>
+                </a:solidFill>
+              </a:rPr>
+              <a:t>utils.py</a:t>
+            </a:r>
+            <a:endParaRPr lang="en-US" sz="1400" b="1" dirty="0">
+              <a:solidFill>
+                <a:schemeClr val="accent1">
+                  <a:lumMod val="50000"/>
+                </a:schemeClr>
+              </a:solidFill>
+            </a:endParaRPr>
+          </a:p>
+          <a:p>
+            <a:pPr marL="285750" indent="-285750">
+              <a:buFont typeface="Wingdings" panose="05000000000000000000" pitchFamily="2" charset="2"/>
+              <a:buChar char="§"/>
+            </a:pPr>
+            <a:r>
+              <a:rPr lang="en-US" sz="2000" b="1" dirty="0"/>
+              <a:t>d</a:t>
+            </a:r>
+            <a:r>
+              <a:rPr lang="en-US" sz="2000" b="1" dirty="0" smtClean="0"/>
+              <a:t>ocs</a:t>
+            </a:r>
+            <a:r>
+              <a:rPr lang="en-US" dirty="0" smtClean="0"/>
+              <a:t/>
+            </a:r>
+            <a:br>
+              <a:rPr lang="en-US" dirty="0" smtClean="0"/>
+            </a:br>
+            <a:r>
+              <a:rPr lang="en-US" sz="1600" dirty="0" smtClean="0"/>
+              <a:t>&gt; template.pptx</a:t>
+            </a:r>
+            <a:br>
+              <a:rPr lang="en-US" sz="1600" dirty="0" smtClean="0"/>
+            </a:br>
+            <a:r>
+              <a:rPr lang="en-US" sz="1600" dirty="0" smtClean="0"/>
+              <a:t>&gt; intermediate results </a:t>
+            </a:r>
+            <a:r>
+              <a:rPr lang="en-US" sz="1600" dirty="0" err="1" smtClean="0"/>
+              <a:t>ppts</a:t>
+            </a:r>
+            <a:r>
+              <a:rPr lang="en-US" sz="1600" dirty="0" smtClean="0"/>
+              <a:t/>
+            </a:r>
+            <a:br>
+              <a:rPr lang="en-US" sz="1600" dirty="0" smtClean="0"/>
+            </a:br>
+            <a:r>
+              <a:rPr lang="en-US" sz="1600" dirty="0" smtClean="0"/>
+              <a:t>&gt; testing results</a:t>
+            </a:r>
+            <a:br>
+              <a:rPr lang="en-US" sz="1600" dirty="0" smtClean="0"/>
+            </a:br>
+            <a:r>
+              <a:rPr lang="en-US" sz="1600" dirty="0" smtClean="0"/>
+              <a:t>&gt; UserGuide.docx</a:t>
+            </a:r>
+          </a:p>
+          <a:p>
+            <a:pPr marL="285750" indent="-285750">
+              <a:buFont typeface="Wingdings" panose="05000000000000000000" pitchFamily="2" charset="2"/>
+              <a:buChar char="§"/>
+            </a:pPr>
+            <a:r>
+              <a:rPr lang="en-US" sz="2000" b="1" dirty="0"/>
+              <a:t>p</a:t>
+            </a:r>
+            <a:r>
+              <a:rPr lang="en-US" sz="2000" b="1" dirty="0" smtClean="0"/>
+              <a:t>apers</a:t>
+            </a:r>
+            <a:br>
+              <a:rPr lang="en-US" sz="2000" b="1" dirty="0" smtClean="0"/>
+            </a:br>
+            <a:r>
+              <a:rPr lang="en-US" sz="1400" dirty="0" smtClean="0"/>
+              <a:t>&gt;</a:t>
+            </a:r>
+            <a:r>
+              <a:rPr lang="en-US" sz="1400" dirty="0" err="1" smtClean="0"/>
+              <a:t>dccnn</a:t>
+            </a:r>
+            <a:r>
+              <a:rPr lang="en-US" sz="1400" dirty="0" smtClean="0"/>
+              <a:t> paper</a:t>
+            </a:r>
+            <a:endParaRPr lang="en-US" sz="2000" dirty="0" smtClean="0"/>
+          </a:p>
+        </p:txBody>
+      </p:sp>
+    </p:spTree>
+    <p:extLst>
+      <p:ext uri="{BB962C8B-B14F-4D97-AF65-F5344CB8AC3E}">
+        <p14:creationId xmlns:p14="http://schemas.microsoft.com/office/powerpoint/2010/main" val="3316311144"/>
+      </p:ext>
+    </p:extLst>
+  </p:cSld>
+  <p:clrMapOvr>
+    <a:masterClrMapping/>
+  </p:clrMapOvr>
+</p:sld>
+</file>
+
+<file path=ppt/slides/slide16.xml><?xml version="1.0" encoding="utf-8"?>
+<p:sld xmlns:a="http://schemas.openxmlformats.org/drawingml/2006/main" xmlns:r="http://schemas.openxmlformats.org/officeDocument/2006/relationships" xmlns:p="http://schemas.openxmlformats.org/presentationml/2006/main">
+  <p:cSld>
+    <p:spTree>
+      <p:nvGrpSpPr>
+        <p:cNvPr id="1" name=""/>
+        <p:cNvGrpSpPr/>
+        <p:nvPr/>
+      </p:nvGrpSpPr>
+      <p:grpSpPr>
+        <a:xfrm>
+          <a:off x="0" y="0"/>
+          <a:ext cx="0" cy="0"/>
+          <a:chOff x="0" y="0"/>
+          <a:chExt cx="0" cy="0"/>
+        </a:xfrm>
+      </p:grpSpPr>
+      <p:sp>
+        <p:nvSpPr>
+          <p:cNvPr id="2" name="Text Placeholder 1"/>
+          <p:cNvSpPr>
+            <a:spLocks noGrp="1"/>
+          </p:cNvSpPr>
+          <p:nvPr>
+            <p:ph type="body" sz="quarter" idx="15"/>
+          </p:nvPr>
+        </p:nvSpPr>
+        <p:spPr/>
+        <p:txBody>
+          <a:bodyPr/>
+          <a:lstStyle/>
+          <a:p>
+            <a:r>
+              <a:rPr lang="en-US" dirty="0" smtClean="0"/>
+              <a:t>Comparison</a:t>
+            </a:r>
+            <a:endParaRPr lang="en-US" dirty="0"/>
+          </a:p>
+        </p:txBody>
+      </p:sp>
+      <p:sp>
+        <p:nvSpPr>
+          <p:cNvPr id="6" name="Slide Number Placeholder 5"/>
+          <p:cNvSpPr>
+            <a:spLocks noGrp="1"/>
+          </p:cNvSpPr>
+          <p:nvPr>
+            <p:ph type="sldNum" sz="quarter" idx="12"/>
+          </p:nvPr>
+        </p:nvSpPr>
+        <p:spPr/>
+        <p:txBody>
+          <a:bodyPr/>
+          <a:lstStyle/>
+          <a:p>
+            <a:fld id="{4898AEC0-503E-4FA4-859C-D0F72D6E3F79}" type="slidenum">
+              <a:rPr lang="de-DE" smtClean="0"/>
+              <a:pPr/>
+              <a:t>16</a:t>
             </a:fld>
             <a:endParaRPr lang="de-DE"/>
           </a:p>
@@ -25743,17 +26058,6 @@
                         </a:rPr>
                         <a:t> freely</a:t>
                       </a:r>
-                      <a:endParaRPr kumimoji="0" lang="en-US" sz="1400" b="0" i="0" u="none" strike="noStrike" kern="0" cap="none" spc="0" normalizeH="0" baseline="0" noProof="0" dirty="0" smtClean="0">
-                        <a:ln>
-                          <a:noFill/>
-                        </a:ln>
-                        <a:solidFill>
-                          <a:srgbClr val="000000"/>
-                        </a:solidFill>
-                        <a:effectLst/>
-                        <a:uLnTx/>
-                        <a:uFillTx/>
-                      </a:endParaRPr>
                     </a:p>
                   </a:txBody>
                   <a:tcPr/>
@@ -26293,7 +26597,7 @@
 </p:sld>
 </file>
 
-<file path=ppt/slides/slide16.xml><?xml version="1.0" encoding="utf-8"?>
+<file path=ppt/slides/slide17.xml><?xml version="1.0" encoding="utf-8"?>
 <p:sld xmlns:a="http://schemas.openxmlformats.org/drawingml/2006/main" xmlns:r="http://schemas.openxmlformats.org/officeDocument/2006/relationships" xmlns:p="http://schemas.openxmlformats.org/presentationml/2006/main">
   <p:cSld>
     <p:spTree>
@@ -26351,7 +26655,7 @@
             <a:fld id="{4898AEC0-503E-4FA4-859C-D0F72D6E3F79}" type="slidenum">
               <a:rPr lang="de-DE" smtClean="0"/>
               <a:pPr/>
-              <a:t>16</a:t>
+              <a:t>17</a:t>
             </a:fld>
             <a:endParaRPr lang="de-DE"/>
           </a:p>
@@ -26505,21 +26809,7 @@
                 <a:uLnTx/>
                 <a:uFillTx/>
               </a:rPr>
-              <a:t>Mathematical </a:t>
-            </a:r>
-            <a:r>
-              <a:rPr kumimoji="0" lang="en-US" sz="1800" b="0" i="0" u="none" strike="noStrike" kern="0" cap="none" spc="0" normalizeH="0" noProof="0" dirty="0" smtClean="0">
-                <a:ln>
-                  <a:noFill/>
-                </a:ln>
-                <a:solidFill>
-                  <a:srgbClr val="000000"/>
-                </a:solidFill>
-                <a:effectLst/>
-                <a:uLnTx/>
-                <a:uFillTx/>
-              </a:rPr>
-              <a:t>equations</a:t>
+              <a:t>Mathematical equations</a:t>
             </a:r>
             <a:br>
               <a:rPr kumimoji="0" lang="en-US" sz="1800" b="0" i="0" u="none" strike="noStrike" kern="0" cap="none" spc="0" normalizeH="0" noProof="0" dirty="0" smtClean="0">
@@ -26649,15 +26939,7 @@
                   <a:srgbClr val="000000"/>
                 </a:solidFill>
               </a:rPr>
-              <a:t>can be </a:t>
-            </a:r>
-            <a:r>
-              <a:rPr lang="en-US" kern="0" baseline="0" dirty="0" smtClean="0">
-                <a:solidFill>
-                  <a:srgbClr val="000000"/>
-                </a:solidFill>
-              </a:rPr>
-              <a:t>implemented</a:t>
+              <a:t>can be implemented</a:t>
             </a:r>
             <a:br>
               <a:rPr lang="en-US" kern="0" baseline="0" dirty="0" smtClean="0">
@@ -28103,21 +28385,7 @@
                 <a:uLnTx/>
                 <a:uFillTx/>
               </a:rPr>
-              <a:t>forward </a:t>
-            </a:r>
-            <a:r>
-              <a:rPr kumimoji="0" lang="en-US" sz="1400" b="0" i="0" u="none" strike="noStrike" kern="0" cap="none" spc="0" normalizeH="0" noProof="0" dirty="0" smtClean="0">
-                <a:ln>
-                  <a:noFill/>
-                </a:ln>
-                <a:solidFill>
-                  <a:srgbClr val="000000"/>
-                </a:solidFill>
-                <a:effectLst/>
-                <a:uLnTx/>
-                <a:uFillTx/>
-              </a:rPr>
-              <a:t>derivative</a:t>
+              <a:t>forward derivative</a:t>
             </a:r>
           </a:p>
           <a:p>
@@ -31491,6 +31759,33 @@
 </file>
 
 <file path=customXml/item1.xml><?xml version="1.0" encoding="utf-8"?>
+<sax_ColorSelect>
+  <Line>
+    <Color val="D70012"/>
+    <Color val="EA6876"/>
+    <Color val="a80163"/>
+    <Color val="D067AD"/>
+    <Color val="3f136c"/>
+    <Color val="967CB1"/>
+    <Color val="08427e"/>
+    <Color val="6D9ABC"/>
+    <Color val="0e78c5"/>
+    <Color val="6FB9E2"/>
+    <Color val="1399a0"/>
+    <Color val="6FC9CC"/>
+    <Color val="67b419"/>
+    <Color val="AEDB7D"/>
+    <Color val="0a5139"/>
+    <Color val="6EA293"/>
+    <Color val="999FA6"/>
+    <Color val="D7D7D7"/>
+    <Color val="000000"/>
+    <Color val="FFFFFF"/>
+  </Line>
+</sax_ColorSelect>
+</file>
+
+<file path=customXml/item2.xml><?xml version="1.0" encoding="utf-8"?>
 <saxML>
   <saxMLTemplate>presentation_169</saxMLTemplate>
   <Variablen>
@@ -31639,41 +31934,14 @@
 </saxML>
 </file>
 
-<file path=customXml/item2.xml><?xml version="1.0" encoding="utf-8"?>
-<sax_ColorSelect>
-  <Line>
-    <Color val="D70012"/>
-    <Color val="EA6876"/>
-    <Color val="a80163"/>
-    <Color val="D067AD"/>
-    <Color val="3f136c"/>
-    <Color val="967CB1"/>
-    <Color val="08427e"/>
-    <Color val="6D9ABC"/>
-    <Color val="0e78c5"/>
-    <Color val="6FB9E2"/>
-    <Color val="1399a0"/>
-    <Color val="6FC9CC"/>
-    <Color val="67b419"/>
-    <Color val="AEDB7D"/>
-    <Color val="0a5139"/>
-    <Color val="6EA293"/>
-    <Color val="999FA6"/>
-    <Color val="D7D7D7"/>
-    <Color val="000000"/>
-    <Color val="FFFFFF"/>
-  </Line>
-</sax_ColorSelect>
-</file>
-
 <file path=customXml/itemProps1.xml><?xml version="1.0" encoding="utf-8"?>
-<ds:datastoreItem xmlns:ds="http://schemas.openxmlformats.org/officeDocument/2006/customXml" ds:itemID="{D0252559-44F8-474C-B66D-E357B88E32C2}">
+<ds:datastoreItem xmlns:ds="http://schemas.openxmlformats.org/officeDocument/2006/customXml" ds:itemID="{304CF217-3C90-4AA0-B541-CE45F9BD305E}">
   <ds:schemaRefs/>
 </ds:datastoreItem>
 </file>
 
 <file path=customXml/itemProps2.xml><?xml version="1.0" encoding="utf-8"?>
-<ds:datastoreItem xmlns:ds="http://schemas.openxmlformats.org/officeDocument/2006/customXml" ds:itemID="{304CF217-3C90-4AA0-B541-CE45F9BD305E}">
+<ds:datastoreItem xmlns:ds="http://schemas.openxmlformats.org/officeDocument/2006/customXml" ds:itemID="{D0252559-44F8-474C-B66D-E357B88E32C2}">
   <ds:schemaRefs/>
 </ds:datastoreItem>
 </file>
</xml_diff>

<commit_message>
documents and userguide updated
</commit_message>
<xml_diff>
--- a/intel_ocr/docs/Intel_Final_Delivery.pptx
+++ b/intel_ocr/docs/Intel_Final_Delivery.pptx
@@ -31883,33 +31883,6 @@
 </file>
 
 <file path=customXml/item1.xml><?xml version="1.0" encoding="utf-8"?>
-<sax_ColorSelect>
-  <Line>
-    <Color val="D70012"/>
-    <Color val="EA6876"/>
-    <Color val="a80163"/>
-    <Color val="D067AD"/>
-    <Color val="3f136c"/>
-    <Color val="967CB1"/>
-    <Color val="08427e"/>
-    <Color val="6D9ABC"/>
-    <Color val="0e78c5"/>
-    <Color val="6FB9E2"/>
-    <Color val="1399a0"/>
-    <Color val="6FC9CC"/>
-    <Color val="67b419"/>
-    <Color val="AEDB7D"/>
-    <Color val="0a5139"/>
-    <Color val="6EA293"/>
-    <Color val="999FA6"/>
-    <Color val="D7D7D7"/>
-    <Color val="000000"/>
-    <Color val="FFFFFF"/>
-  </Line>
-</sax_ColorSelect>
-</file>
-
-<file path=customXml/item2.xml><?xml version="1.0" encoding="utf-8"?>
 <saxML>
   <saxMLTemplate>presentation_169</saxMLTemplate>
   <Variablen>
@@ -32058,14 +32031,41 @@
 </saxML>
 </file>
 
+<file path=customXml/item2.xml><?xml version="1.0" encoding="utf-8"?>
+<sax_ColorSelect>
+  <Line>
+    <Color val="D70012"/>
+    <Color val="EA6876"/>
+    <Color val="a80163"/>
+    <Color val="D067AD"/>
+    <Color val="3f136c"/>
+    <Color val="967CB1"/>
+    <Color val="08427e"/>
+    <Color val="6D9ABC"/>
+    <Color val="0e78c5"/>
+    <Color val="6FB9E2"/>
+    <Color val="1399a0"/>
+    <Color val="6FC9CC"/>
+    <Color val="67b419"/>
+    <Color val="AEDB7D"/>
+    <Color val="0a5139"/>
+    <Color val="6EA293"/>
+    <Color val="999FA6"/>
+    <Color val="D7D7D7"/>
+    <Color val="000000"/>
+    <Color val="FFFFFF"/>
+  </Line>
+</sax_ColorSelect>
+</file>
+
 <file path=customXml/itemProps1.xml><?xml version="1.0" encoding="utf-8"?>
-<ds:datastoreItem xmlns:ds="http://schemas.openxmlformats.org/officeDocument/2006/customXml" ds:itemID="{304CF217-3C90-4AA0-B541-CE45F9BD305E}">
+<ds:datastoreItem xmlns:ds="http://schemas.openxmlformats.org/officeDocument/2006/customXml" ds:itemID="{D0252559-44F8-474C-B66D-E357B88E32C2}">
   <ds:schemaRefs/>
 </ds:datastoreItem>
 </file>
 
 <file path=customXml/itemProps2.xml><?xml version="1.0" encoding="utf-8"?>
-<ds:datastoreItem xmlns:ds="http://schemas.openxmlformats.org/officeDocument/2006/customXml" ds:itemID="{D0252559-44F8-474C-B66D-E357B88E32C2}">
+<ds:datastoreItem xmlns:ds="http://schemas.openxmlformats.org/officeDocument/2006/customXml" ds:itemID="{304CF217-3C90-4AA0-B541-CE45F9BD305E}">
   <ds:schemaRefs/>
 </ds:datastoreItem>
 </file>
</xml_diff>